<commit_message>
A projekten dolgozó fejlesztők képeinek beimportálása a ppt-be
</commit_message>
<xml_diff>
--- a/powerpoint/Informee.pptx
+++ b/powerpoint/Informee.pptx
@@ -255,7 +255,7 @@
           <a:p>
             <a:fld id="{777C529C-5A85-4259-966E-4DA674C0E223}" type="datetimeFigureOut">
               <a:rPr lang="hu-HU" smtClean="0"/>
-              <a:t>2024.04.29.</a:t>
+              <a:t>2024.04.30.</a:t>
             </a:fld>
             <a:endParaRPr lang="hu-HU"/>
           </a:p>
@@ -425,7 +425,7 @@
           <a:p>
             <a:fld id="{777C529C-5A85-4259-966E-4DA674C0E223}" type="datetimeFigureOut">
               <a:rPr lang="hu-HU" smtClean="0"/>
-              <a:t>2024.04.29.</a:t>
+              <a:t>2024.04.30.</a:t>
             </a:fld>
             <a:endParaRPr lang="hu-HU"/>
           </a:p>
@@ -605,7 +605,7 @@
           <a:p>
             <a:fld id="{777C529C-5A85-4259-966E-4DA674C0E223}" type="datetimeFigureOut">
               <a:rPr lang="hu-HU" smtClean="0"/>
-              <a:t>2024.04.29.</a:t>
+              <a:t>2024.04.30.</a:t>
             </a:fld>
             <a:endParaRPr lang="hu-HU"/>
           </a:p>
@@ -775,7 +775,7 @@
           <a:p>
             <a:fld id="{777C529C-5A85-4259-966E-4DA674C0E223}" type="datetimeFigureOut">
               <a:rPr lang="hu-HU" smtClean="0"/>
-              <a:t>2024.04.29.</a:t>
+              <a:t>2024.04.30.</a:t>
             </a:fld>
             <a:endParaRPr lang="hu-HU"/>
           </a:p>
@@ -1021,7 +1021,7 @@
           <a:p>
             <a:fld id="{777C529C-5A85-4259-966E-4DA674C0E223}" type="datetimeFigureOut">
               <a:rPr lang="hu-HU" smtClean="0"/>
-              <a:t>2024.04.29.</a:t>
+              <a:t>2024.04.30.</a:t>
             </a:fld>
             <a:endParaRPr lang="hu-HU"/>
           </a:p>
@@ -1253,7 +1253,7 @@
           <a:p>
             <a:fld id="{777C529C-5A85-4259-966E-4DA674C0E223}" type="datetimeFigureOut">
               <a:rPr lang="hu-HU" smtClean="0"/>
-              <a:t>2024.04.29.</a:t>
+              <a:t>2024.04.30.</a:t>
             </a:fld>
             <a:endParaRPr lang="hu-HU"/>
           </a:p>
@@ -1620,7 +1620,7 @@
           <a:p>
             <a:fld id="{777C529C-5A85-4259-966E-4DA674C0E223}" type="datetimeFigureOut">
               <a:rPr lang="hu-HU" smtClean="0"/>
-              <a:t>2024.04.29.</a:t>
+              <a:t>2024.04.30.</a:t>
             </a:fld>
             <a:endParaRPr lang="hu-HU"/>
           </a:p>
@@ -1738,7 +1738,7 @@
           <a:p>
             <a:fld id="{777C529C-5A85-4259-966E-4DA674C0E223}" type="datetimeFigureOut">
               <a:rPr lang="hu-HU" smtClean="0"/>
-              <a:t>2024.04.29.</a:t>
+              <a:t>2024.04.30.</a:t>
             </a:fld>
             <a:endParaRPr lang="hu-HU"/>
           </a:p>
@@ -1833,7 +1833,7 @@
           <a:p>
             <a:fld id="{777C529C-5A85-4259-966E-4DA674C0E223}" type="datetimeFigureOut">
               <a:rPr lang="hu-HU" smtClean="0"/>
-              <a:t>2024.04.29.</a:t>
+              <a:t>2024.04.30.</a:t>
             </a:fld>
             <a:endParaRPr lang="hu-HU"/>
           </a:p>
@@ -2110,7 +2110,7 @@
           <a:p>
             <a:fld id="{777C529C-5A85-4259-966E-4DA674C0E223}" type="datetimeFigureOut">
               <a:rPr lang="hu-HU" smtClean="0"/>
-              <a:t>2024.04.29.</a:t>
+              <a:t>2024.04.30.</a:t>
             </a:fld>
             <a:endParaRPr lang="hu-HU"/>
           </a:p>
@@ -2363,7 +2363,7 @@
           <a:p>
             <a:fld id="{777C529C-5A85-4259-966E-4DA674C0E223}" type="datetimeFigureOut">
               <a:rPr lang="hu-HU" smtClean="0"/>
-              <a:t>2024.04.29.</a:t>
+              <a:t>2024.04.30.</a:t>
             </a:fld>
             <a:endParaRPr lang="hu-HU"/>
           </a:p>
@@ -2576,7 +2576,7 @@
           <a:p>
             <a:fld id="{777C529C-5A85-4259-966E-4DA674C0E223}" type="datetimeFigureOut">
               <a:rPr lang="hu-HU" smtClean="0"/>
-              <a:t>2024.04.29.</a:t>
+              <a:t>2024.04.30.</a:t>
             </a:fld>
             <a:endParaRPr lang="hu-HU"/>
           </a:p>
@@ -3027,6 +3027,13 @@
   <p:clrMapOvr>
     <a:masterClrMapping/>
   </p:clrMapOvr>
+  <p:timing>
+    <p:tnLst>
+      <p:par>
+        <p:cTn id="1" dur="indefinite" restart="never" nodeType="tmRoot"/>
+      </p:par>
+    </p:tnLst>
+  </p:timing>
 </p:sld>
 </file>
 
@@ -3059,7 +3066,7 @@
         </p:nvSpPr>
         <p:spPr>
           <a:xfrm>
-            <a:off x="838200" y="365125"/>
+            <a:off x="255707" y="211422"/>
             <a:ext cx="5257800" cy="1325563"/>
           </a:xfrm>
         </p:spPr>
@@ -3111,8 +3118,8 @@
         </p:blipFill>
         <p:spPr>
           <a:xfrm>
-            <a:off x="1040912" y="1577127"/>
-            <a:ext cx="2426188" cy="1851873"/>
+            <a:off x="5228389" y="1359502"/>
+            <a:ext cx="2106000" cy="2807841"/>
           </a:xfrm>
           <a:prstGeom prst="rect">
             <a:avLst/>
@@ -3127,7 +3134,7 @@
         </p:nvSpPr>
         <p:spPr>
           <a:xfrm>
-            <a:off x="1247569" y="3429000"/>
+            <a:off x="5274952" y="4167343"/>
             <a:ext cx="2012873" cy="400110"/>
           </a:xfrm>
           <a:prstGeom prst="rect">
@@ -3146,7 +3153,277 @@
                 <a:latin typeface="Arial" panose="020B0604020202020204" pitchFamily="34" charset="0"/>
                 <a:cs typeface="Arial" panose="020B0604020202020204" pitchFamily="34" charset="0"/>
               </a:rPr>
-              <a:t>Császár András</a:t>
+              <a:t>Császár </a:t>
+            </a:r>
+            <a:r>
+              <a:rPr lang="hu-HU" sz="2000" dirty="0" smtClean="0">
+                <a:latin typeface="Arial" panose="020B0604020202020204" pitchFamily="34" charset="0"/>
+                <a:cs typeface="Arial" panose="020B0604020202020204" pitchFamily="34" charset="0"/>
+              </a:rPr>
+              <a:t>András</a:t>
+            </a:r>
+            <a:endParaRPr lang="hu-HU" sz="2000" dirty="0">
+              <a:latin typeface="Arial" panose="020B0604020202020204" pitchFamily="34" charset="0"/>
+              <a:cs typeface="Arial" panose="020B0604020202020204" pitchFamily="34" charset="0"/>
+            </a:endParaRPr>
+          </a:p>
+        </p:txBody>
+      </p:sp>
+      <p:pic>
+        <p:nvPicPr>
+          <p:cNvPr id="3" name="Kép 2"/>
+          <p:cNvPicPr>
+            <a:picLocks noChangeAspect="1"/>
+          </p:cNvPicPr>
+          <p:nvPr/>
+        </p:nvPicPr>
+        <p:blipFill>
+          <a:blip r:embed="rId3" cstate="print">
+            <a:extLst>
+              <a:ext uri="{28A0092B-C50C-407E-A947-70E740481C1C}">
+                <a14:useLocalDpi xmlns:a14="http://schemas.microsoft.com/office/drawing/2010/main" val="0"/>
+              </a:ext>
+            </a:extLst>
+          </a:blip>
+          <a:stretch>
+            <a:fillRect/>
+          </a:stretch>
+        </p:blipFill>
+        <p:spPr>
+          <a:xfrm>
+            <a:off x="7524527" y="3447164"/>
+            <a:ext cx="2106720" cy="2808960"/>
+          </a:xfrm>
+          <a:prstGeom prst="rect">
+            <a:avLst/>
+          </a:prstGeom>
+        </p:spPr>
+      </p:pic>
+      <p:pic>
+        <p:nvPicPr>
+          <p:cNvPr id="4" name="Kép 3"/>
+          <p:cNvPicPr>
+            <a:picLocks noChangeAspect="1"/>
+          </p:cNvPicPr>
+          <p:nvPr/>
+        </p:nvPicPr>
+        <p:blipFill>
+          <a:blip r:embed="rId4" cstate="print">
+            <a:extLst>
+              <a:ext uri="{28A0092B-C50C-407E-A947-70E740481C1C}">
+                <a14:useLocalDpi xmlns:a14="http://schemas.microsoft.com/office/drawing/2010/main" val="0"/>
+              </a:ext>
+            </a:extLst>
+          </a:blip>
+          <a:stretch>
+            <a:fillRect/>
+          </a:stretch>
+        </p:blipFill>
+        <p:spPr>
+          <a:xfrm>
+            <a:off x="9631247" y="453538"/>
+            <a:ext cx="2106720" cy="2808960"/>
+          </a:xfrm>
+          <a:prstGeom prst="rect">
+            <a:avLst/>
+          </a:prstGeom>
+        </p:spPr>
+      </p:pic>
+      <p:sp>
+        <p:nvSpPr>
+          <p:cNvPr id="8" name="Téglalap 7"/>
+          <p:cNvSpPr/>
+          <p:nvPr/>
+        </p:nvSpPr>
+        <p:spPr>
+          <a:xfrm>
+            <a:off x="7741760" y="6256124"/>
+            <a:ext cx="1672253" cy="369332"/>
+          </a:xfrm>
+          <a:prstGeom prst="rect">
+            <a:avLst/>
+          </a:prstGeom>
+        </p:spPr>
+        <p:txBody>
+          <a:bodyPr wrap="none">
+            <a:spAutoFit/>
+          </a:bodyPr>
+          <a:lstStyle/>
+          <a:p>
+            <a:r>
+              <a:rPr lang="hu-HU" dirty="0" smtClean="0">
+                <a:latin typeface="Arial" panose="020B0604020202020204" pitchFamily="34" charset="0"/>
+                <a:cs typeface="Arial" panose="020B0604020202020204" pitchFamily="34" charset="0"/>
+              </a:rPr>
+              <a:t>Csanádi Kevin</a:t>
+            </a:r>
+            <a:endParaRPr lang="hu-HU" dirty="0">
+              <a:latin typeface="Arial" panose="020B0604020202020204" pitchFamily="34" charset="0"/>
+              <a:cs typeface="Arial" panose="020B0604020202020204" pitchFamily="34" charset="0"/>
+            </a:endParaRPr>
+          </a:p>
+        </p:txBody>
+      </p:sp>
+      <p:sp>
+        <p:nvSpPr>
+          <p:cNvPr id="9" name="Szövegdoboz 8"/>
+          <p:cNvSpPr txBox="1"/>
+          <p:nvPr/>
+        </p:nvSpPr>
+        <p:spPr>
+          <a:xfrm>
+            <a:off x="9678171" y="3262498"/>
+            <a:ext cx="2012873" cy="400110"/>
+          </a:xfrm>
+          <a:prstGeom prst="rect">
+            <a:avLst/>
+          </a:prstGeom>
+          <a:noFill/>
+        </p:spPr>
+        <p:txBody>
+          <a:bodyPr wrap="square" rtlCol="0">
+            <a:spAutoFit/>
+          </a:bodyPr>
+          <a:lstStyle/>
+          <a:p>
+            <a:r>
+              <a:rPr lang="hu-HU" sz="2000" dirty="0" smtClean="0">
+                <a:latin typeface="Arial" panose="020B0604020202020204" pitchFamily="34" charset="0"/>
+                <a:cs typeface="Arial" panose="020B0604020202020204" pitchFamily="34" charset="0"/>
+              </a:rPr>
+              <a:t>Kulimák Máték</a:t>
+            </a:r>
+            <a:endParaRPr lang="hu-HU" sz="2000" dirty="0">
+              <a:latin typeface="Arial" panose="020B0604020202020204" pitchFamily="34" charset="0"/>
+              <a:cs typeface="Arial" panose="020B0604020202020204" pitchFamily="34" charset="0"/>
+            </a:endParaRPr>
+          </a:p>
+        </p:txBody>
+      </p:sp>
+      <p:pic>
+        <p:nvPicPr>
+          <p:cNvPr id="10" name="Kép 9"/>
+          <p:cNvPicPr>
+            <a:picLocks noChangeAspect="1"/>
+          </p:cNvPicPr>
+          <p:nvPr/>
+        </p:nvPicPr>
+        <p:blipFill>
+          <a:blip r:embed="rId5" cstate="print">
+            <a:extLst>
+              <a:ext uri="{28A0092B-C50C-407E-A947-70E740481C1C}">
+                <a14:useLocalDpi xmlns:a14="http://schemas.microsoft.com/office/drawing/2010/main" val="0"/>
+              </a:ext>
+            </a:extLst>
+          </a:blip>
+          <a:stretch>
+            <a:fillRect/>
+          </a:stretch>
+        </p:blipFill>
+        <p:spPr>
+          <a:xfrm>
+            <a:off x="284638" y="1690688"/>
+            <a:ext cx="2106000" cy="2808960"/>
+          </a:xfrm>
+          <a:prstGeom prst="rect">
+            <a:avLst/>
+          </a:prstGeom>
+        </p:spPr>
+      </p:pic>
+      <p:pic>
+        <p:nvPicPr>
+          <p:cNvPr id="11" name="Kép 10"/>
+          <p:cNvPicPr>
+            <a:picLocks noChangeAspect="1"/>
+          </p:cNvPicPr>
+          <p:nvPr/>
+        </p:nvPicPr>
+        <p:blipFill>
+          <a:blip r:embed="rId6" cstate="print">
+            <a:extLst>
+              <a:ext uri="{28A0092B-C50C-407E-A947-70E740481C1C}">
+                <a14:useLocalDpi xmlns:a14="http://schemas.microsoft.com/office/drawing/2010/main" val="0"/>
+              </a:ext>
+            </a:extLst>
+          </a:blip>
+          <a:stretch>
+            <a:fillRect/>
+          </a:stretch>
+        </p:blipFill>
+        <p:spPr>
+          <a:xfrm>
+            <a:off x="2715018" y="3604246"/>
+            <a:ext cx="2106000" cy="2807999"/>
+          </a:xfrm>
+          <a:prstGeom prst="rect">
+            <a:avLst/>
+          </a:prstGeom>
+        </p:spPr>
+      </p:pic>
+      <p:sp>
+        <p:nvSpPr>
+          <p:cNvPr id="12" name="Szövegdoboz 11"/>
+          <p:cNvSpPr txBox="1"/>
+          <p:nvPr/>
+        </p:nvSpPr>
+        <p:spPr>
+          <a:xfrm>
+            <a:off x="2761581" y="6412245"/>
+            <a:ext cx="2012873" cy="400110"/>
+          </a:xfrm>
+          <a:prstGeom prst="rect">
+            <a:avLst/>
+          </a:prstGeom>
+          <a:noFill/>
+        </p:spPr>
+        <p:txBody>
+          <a:bodyPr wrap="square" rtlCol="0">
+            <a:spAutoFit/>
+          </a:bodyPr>
+          <a:lstStyle/>
+          <a:p>
+            <a:r>
+              <a:rPr lang="hu-HU" sz="2000" dirty="0" smtClean="0">
+                <a:latin typeface="Arial" panose="020B0604020202020204" pitchFamily="34" charset="0"/>
+                <a:cs typeface="Arial" panose="020B0604020202020204" pitchFamily="34" charset="0"/>
+              </a:rPr>
+              <a:t>Tátrai Dominik</a:t>
+            </a:r>
+            <a:endParaRPr lang="hu-HU" sz="2000" dirty="0">
+              <a:latin typeface="Arial" panose="020B0604020202020204" pitchFamily="34" charset="0"/>
+              <a:cs typeface="Arial" panose="020B0604020202020204" pitchFamily="34" charset="0"/>
+            </a:endParaRPr>
+          </a:p>
+        </p:txBody>
+      </p:sp>
+      <p:sp>
+        <p:nvSpPr>
+          <p:cNvPr id="13" name="Szövegdoboz 12"/>
+          <p:cNvSpPr txBox="1"/>
+          <p:nvPr/>
+        </p:nvSpPr>
+        <p:spPr>
+          <a:xfrm>
+            <a:off x="307919" y="4499648"/>
+            <a:ext cx="2059437" cy="400110"/>
+          </a:xfrm>
+          <a:prstGeom prst="rect">
+            <a:avLst/>
+          </a:prstGeom>
+          <a:noFill/>
+        </p:spPr>
+        <p:txBody>
+          <a:bodyPr wrap="square" rtlCol="0">
+            <a:spAutoFit/>
+          </a:bodyPr>
+          <a:lstStyle/>
+          <a:p>
+            <a:r>
+              <a:rPr lang="hu-HU" sz="2000" dirty="0" smtClean="0">
+                <a:latin typeface="Arial" panose="020B0604020202020204" pitchFamily="34" charset="0"/>
+                <a:cs typeface="Arial" panose="020B0604020202020204" pitchFamily="34" charset="0"/>
+              </a:rPr>
+              <a:t>Kővágó Levente</a:t>
             </a:r>
             <a:endParaRPr lang="hu-HU" sz="2000" dirty="0">
               <a:latin typeface="Arial" panose="020B0604020202020204" pitchFamily="34" charset="0"/>
@@ -3165,6 +3442,13 @@
   <p:clrMapOvr>
     <a:masterClrMapping/>
   </p:clrMapOvr>
+  <p:timing>
+    <p:tnLst>
+      <p:par>
+        <p:cTn id="1" dur="indefinite" restart="never" nodeType="tmRoot"/>
+      </p:par>
+    </p:tnLst>
+  </p:timing>
 </p:sld>
 </file>
 

</xml_diff>